<commit_message>
M0078DDG-441 Remove Studio as a light version of the SDK
Keep "Studio" only when speaking about rebranding

- Update the Studio glossary definition
- Also replace "MicroEJ SDK" by "SDK"
</commit_message>
<xml_diff>
--- a/SDKUserGuide/images/1_overview.pptx
+++ b/SDKUserGuide/images/1_overview.pptx
@@ -229,7 +229,7 @@
               <a:rPr lang="fr-FR" smtClean="0">
                 <a:latin typeface="Calibri Regular" charset="0"/>
               </a:rPr>
-              <a:t>February 20</a:t>
+              <a:t>septembre 21</a:t>
             </a:fld>
             <a:endParaRPr lang="en-US" dirty="0">
               <a:latin typeface="Calibri Regular" charset="0"/>
@@ -408,7 +408,7 @@
             <a:fld id="{79958FA1-9FE8-F149-AB4B-7DC9950B39E9}" type="datetime6">
               <a:rPr lang="fr-FR" smtClean="0"/>
               <a:pPr/>
-              <a:t>February 20</a:t>
+              <a:t>septembre 21</a:t>
             </a:fld>
             <a:endParaRPr lang="en-US" dirty="0"/>
           </a:p>
@@ -472,38 +472,37 @@
           <a:p>
             <a:pPr lvl="0"/>
             <a:r>
-              <a:rPr lang="en-US" dirty="0" smtClean="0"/>
+              <a:rPr lang="en-US" dirty="0"/>
               <a:t>Click to edit Master text styles</a:t>
             </a:r>
           </a:p>
           <a:p>
             <a:pPr lvl="1"/>
             <a:r>
-              <a:rPr lang="en-US" dirty="0" smtClean="0"/>
+              <a:rPr lang="en-US" dirty="0"/>
               <a:t>Second level</a:t>
             </a:r>
           </a:p>
           <a:p>
             <a:pPr lvl="2"/>
             <a:r>
-              <a:rPr lang="en-US" dirty="0" smtClean="0"/>
+              <a:rPr lang="en-US" dirty="0"/>
               <a:t>Third level</a:t>
             </a:r>
           </a:p>
           <a:p>
             <a:pPr lvl="3"/>
             <a:r>
-              <a:rPr lang="en-US" dirty="0" smtClean="0"/>
+              <a:rPr lang="en-US" dirty="0"/>
               <a:t>Fourth level</a:t>
             </a:r>
           </a:p>
           <a:p>
             <a:pPr lvl="4"/>
             <a:r>
-              <a:rPr lang="en-US" dirty="0" smtClean="0"/>
+              <a:rPr lang="en-US" dirty="0"/>
               <a:t>Fifth level</a:t>
             </a:r>
-            <a:endParaRPr lang="en-US" dirty="0"/>
           </a:p>
         </p:txBody>
       </p:sp>
@@ -731,7 +730,7 @@
           </a:lstStyle>
           <a:p>
             <a:r>
-              <a:rPr lang="en-US" smtClean="0"/>
+              <a:rPr lang="en-US"/>
               <a:t>Click to edit Master title style</a:t>
             </a:r>
             <a:endParaRPr lang="en-US" dirty="0"/>
@@ -851,7 +850,7 @@
           </a:lstStyle>
           <a:p>
             <a:r>
-              <a:rPr lang="en-US" smtClean="0"/>
+              <a:rPr lang="en-US"/>
               <a:t>Click to edit Master subtitle style</a:t>
             </a:r>
             <a:endParaRPr lang="en-US" dirty="0"/>
@@ -881,7 +880,7 @@
           <a:p>
             <a:pPr algn="ctr"/>
             <a:r>
-              <a:rPr lang="en-US" sz="1200" b="0" i="0" dirty="0" smtClean="0">
+              <a:rPr lang="en-US" sz="1200" b="0" i="0" dirty="0">
                 <a:solidFill>
                   <a:schemeClr val="tx2"/>
                 </a:solidFill>
@@ -934,13 +933,6 @@
   <p:clrMapOvr>
     <a:masterClrMapping/>
   </p:clrMapOvr>
-  <p:timing>
-    <p:tnLst>
-      <p:par>
-        <p:cTn id="1" dur="indefinite" restart="never" nodeType="tmRoot"/>
-      </p:par>
-    </p:tnLst>
-  </p:timing>
 </p:sldLayout>
 </file>
 
@@ -1018,35 +1010,35 @@
           <a:p>
             <a:pPr lvl="0"/>
             <a:r>
-              <a:rPr lang="en-US" smtClean="0"/>
+              <a:rPr lang="en-US"/>
               <a:t>Click to edit Master text styles</a:t>
             </a:r>
           </a:p>
           <a:p>
             <a:pPr lvl="1"/>
             <a:r>
-              <a:rPr lang="en-US" smtClean="0"/>
+              <a:rPr lang="en-US"/>
               <a:t>Second level</a:t>
             </a:r>
           </a:p>
           <a:p>
             <a:pPr lvl="2"/>
             <a:r>
-              <a:rPr lang="en-US" smtClean="0"/>
+              <a:rPr lang="en-US"/>
               <a:t>Third level</a:t>
             </a:r>
           </a:p>
           <a:p>
             <a:pPr lvl="3"/>
             <a:r>
-              <a:rPr lang="en-US" smtClean="0"/>
+              <a:rPr lang="en-US"/>
               <a:t>Fourth level</a:t>
             </a:r>
           </a:p>
           <a:p>
             <a:pPr lvl="4"/>
             <a:r>
-              <a:rPr lang="en-US" smtClean="0"/>
+              <a:rPr lang="en-US"/>
               <a:t>Fifth level</a:t>
             </a:r>
             <a:endParaRPr lang="en-US" dirty="0"/>
@@ -1114,7 +1106,7 @@
           <a:p>
             <a:pPr lvl="0"/>
             <a:r>
-              <a:rPr lang="en-US" smtClean="0"/>
+              <a:rPr lang="en-US"/>
               <a:t>Click to edit Master text styles</a:t>
             </a:r>
           </a:p>
@@ -1147,7 +1139,7 @@
           </a:lstStyle>
           <a:p>
             <a:r>
-              <a:rPr lang="en-US" smtClean="0"/>
+              <a:rPr lang="en-US"/>
               <a:t>Click to edit Master title style</a:t>
             </a:r>
             <a:endParaRPr lang="fr-FR" dirty="0"/>
@@ -1171,7 +1163,7 @@
           <a:p>
             <a:fld id="{7E8DAAE0-7A9E-9F46-B84D-C44AC8DB25A2}" type="datetime6">
               <a:rPr lang="fr-FR" smtClean="0"/>
-              <a:t>February 20</a:t>
+              <a:t>septembre 21</a:t>
             </a:fld>
             <a:endParaRPr lang="en-US" dirty="0"/>
           </a:p>
@@ -1252,13 +1244,6 @@
   <p:clrMapOvr>
     <a:masterClrMapping/>
   </p:clrMapOvr>
-  <p:timing>
-    <p:tnLst>
-      <p:par>
-        <p:cTn id="1" dur="indefinite" restart="never" nodeType="tmRoot"/>
-      </p:par>
-    </p:tnLst>
-  </p:timing>
 </p:sldLayout>
 </file>
 
@@ -1304,7 +1289,7 @@
           </a:lstStyle>
           <a:p>
             <a:r>
-              <a:rPr lang="en-US" smtClean="0"/>
+              <a:rPr lang="en-US"/>
               <a:t>Click to edit Master title style</a:t>
             </a:r>
             <a:endParaRPr lang="fr-FR" dirty="0"/>
@@ -1328,7 +1313,7 @@
           <a:p>
             <a:fld id="{F9582307-04DB-2F4D-BDB0-614E4902BA9E}" type="datetime6">
               <a:rPr lang="fr-FR" smtClean="0"/>
-              <a:t>February 20</a:t>
+              <a:t>septembre 21</a:t>
             </a:fld>
             <a:endParaRPr lang="en-US" dirty="0"/>
           </a:p>
@@ -1379,7 +1364,7 @@
           <a:lstStyle/>
           <a:p>
             <a:r>
-              <a:rPr lang="en-US" smtClean="0"/>
+              <a:rPr lang="en-US"/>
               <a:t>Drag picture to placeholder or click icon to add</a:t>
             </a:r>
             <a:endParaRPr lang="fr-FR" dirty="0"/>
@@ -1437,13 +1422,6 @@
   <p:clrMapOvr>
     <a:masterClrMapping/>
   </p:clrMapOvr>
-  <p:timing>
-    <p:tnLst>
-      <p:par>
-        <p:cTn id="1" dur="indefinite" restart="never" nodeType="tmRoot"/>
-      </p:par>
-    </p:tnLst>
-  </p:timing>
 </p:sldLayout>
 </file>
 
@@ -1481,7 +1459,7 @@
           <a:p>
             <a:fld id="{180A4ADF-D2E2-C44F-9BED-DE909ECFAA4C}" type="datetime6">
               <a:rPr lang="fr-FR" smtClean="0"/>
-              <a:t>February 20</a:t>
+              <a:t>septembre 21</a:t>
             </a:fld>
             <a:endParaRPr lang="en-US" dirty="0"/>
           </a:p>
@@ -1532,7 +1510,7 @@
           <a:lstStyle/>
           <a:p>
             <a:r>
-              <a:rPr lang="en-US" smtClean="0"/>
+              <a:rPr lang="en-US"/>
               <a:t>Drag picture to placeholder or click icon to add</a:t>
             </a:r>
             <a:endParaRPr lang="fr-FR" dirty="0"/>
@@ -1590,13 +1568,6 @@
   <p:clrMapOvr>
     <a:masterClrMapping/>
   </p:clrMapOvr>
-  <p:timing>
-    <p:tnLst>
-      <p:par>
-        <p:cTn id="1" dur="indefinite" restart="never" nodeType="tmRoot"/>
-      </p:par>
-    </p:tnLst>
-  </p:timing>
 </p:sldLayout>
 </file>
 
@@ -1689,7 +1660,7 @@
             <a:fld id="{22DD8F49-BF83-0E4D-8954-2DA98C3220A2}" type="datetime6">
               <a:rPr lang="fr-FR" smtClean="0"/>
               <a:pPr/>
-              <a:t>February 20</a:t>
+              <a:t>septembre 21</a:t>
             </a:fld>
             <a:endParaRPr lang="en-US" dirty="0"/>
           </a:p>
@@ -1758,20 +1729,17 @@
           </a:lstStyle>
           <a:p>
             <a:r>
-              <a:rPr lang="en-US" sz="6600" dirty="0" smtClean="0"/>
+              <a:rPr lang="en-US" sz="6600" dirty="0"/>
               <a:t>THANK YOU </a:t>
             </a:r>
           </a:p>
           <a:p>
             <a:r>
-              <a:rPr lang="en-US" sz="2800" dirty="0" smtClean="0">
+              <a:rPr lang="en-US" sz="2800" dirty="0">
                 <a:latin typeface="+mn-lt"/>
               </a:rPr>
               <a:t>FOR YOUR ATTENTION!</a:t>
             </a:r>
-            <a:endParaRPr lang="en-US" sz="2800" dirty="0">
-              <a:latin typeface="+mn-lt"/>
-            </a:endParaRPr>
           </a:p>
         </p:txBody>
       </p:sp>
@@ -1866,7 +1834,7 @@
           <a:p>
             <a:pPr algn="ctr"/>
             <a:r>
-              <a:rPr lang="en-US" sz="1200" b="0" i="0" dirty="0" smtClean="0">
+              <a:rPr lang="en-US" sz="1200" b="0" i="0" dirty="0">
                 <a:solidFill>
                   <a:schemeClr val="accent1">
                     <a:lumMod val="40000"/>
@@ -1946,7 +1914,7 @@
           </a:lstStyle>
           <a:p>
             <a:r>
-              <a:rPr lang="en-US" smtClean="0"/>
+              <a:rPr lang="en-US"/>
               <a:t>Click to edit Master title style</a:t>
             </a:r>
             <a:endParaRPr lang="en-US" dirty="0"/>
@@ -2071,7 +2039,7 @@
           </a:lstStyle>
           <a:p>
             <a:r>
-              <a:rPr lang="en-US" smtClean="0"/>
+              <a:rPr lang="en-US"/>
               <a:t>Click to edit Master subtitle style</a:t>
             </a:r>
             <a:endParaRPr lang="en-US" dirty="0"/>
@@ -2088,13 +2056,6 @@
   <p:clrMapOvr>
     <a:overrideClrMapping bg1="lt1" tx1="dk1" bg2="lt2" tx2="dk2" accent1="accent1" accent2="accent2" accent3="accent3" accent4="accent4" accent5="accent5" accent6="accent6" hlink="hlink" folHlink="folHlink"/>
   </p:clrMapOvr>
-  <p:timing>
-    <p:tnLst>
-      <p:par>
-        <p:cTn id="1" dur="indefinite" restart="never" nodeType="tmRoot"/>
-      </p:par>
-    </p:tnLst>
-  </p:timing>
 </p:sldLayout>
 </file>
 
@@ -2177,7 +2138,7 @@
           </a:lstStyle>
           <a:p>
             <a:r>
-              <a:rPr lang="en-US" smtClean="0"/>
+              <a:rPr lang="en-US"/>
               <a:t>Click to edit Master title style</a:t>
             </a:r>
             <a:endParaRPr lang="en-US" dirty="0"/>
@@ -2297,7 +2258,7 @@
           </a:lstStyle>
           <a:p>
             <a:r>
-              <a:rPr lang="en-US" smtClean="0"/>
+              <a:rPr lang="en-US"/>
               <a:t>Click to edit Master subtitle style</a:t>
             </a:r>
             <a:endParaRPr lang="en-US" dirty="0"/>
@@ -2327,7 +2288,7 @@
           <a:p>
             <a:pPr algn="ctr"/>
             <a:r>
-              <a:rPr lang="en-US" sz="1200" b="0" i="0" dirty="0" smtClean="0">
+              <a:rPr lang="en-US" sz="1200" b="0" i="0" dirty="0">
                 <a:solidFill>
                   <a:schemeClr val="tx2"/>
                 </a:solidFill>
@@ -2380,13 +2341,6 @@
   <p:clrMapOvr>
     <a:masterClrMapping/>
   </p:clrMapOvr>
-  <p:timing>
-    <p:tnLst>
-      <p:par>
-        <p:cTn id="1" dur="indefinite" restart="never" nodeType="tmRoot"/>
-      </p:par>
-    </p:tnLst>
-  </p:timing>
 </p:sldLayout>
 </file>
 
@@ -2446,10 +2400,9 @@
           </a:lstStyle>
           <a:p>
             <a:r>
-              <a:rPr lang="en-US" dirty="0" smtClean="0"/>
+              <a:rPr lang="en-US" dirty="0"/>
               <a:t>Click to edit Section title style</a:t>
             </a:r>
-            <a:endParaRPr lang="en-US" dirty="0"/>
           </a:p>
         </p:txBody>
       </p:sp>
@@ -2504,13 +2457,6 @@
   <p:clrMapOvr>
     <a:masterClrMapping/>
   </p:clrMapOvr>
-  <p:timing>
-    <p:tnLst>
-      <p:par>
-        <p:cTn id="1" dur="indefinite" restart="never" nodeType="tmRoot"/>
-      </p:par>
-    </p:tnLst>
-  </p:timing>
 </p:sldLayout>
 </file>
 
@@ -2570,35 +2516,35 @@
           <a:p>
             <a:pPr lvl="0"/>
             <a:r>
-              <a:rPr lang="fr-FR" dirty="0" smtClean="0"/>
+              <a:rPr lang="fr-FR" dirty="0"/>
               <a:t>Cliquez et modifiez le contenu</a:t>
             </a:r>
           </a:p>
           <a:p>
             <a:pPr lvl="1"/>
             <a:r>
-              <a:rPr lang="fr-FR" dirty="0" smtClean="0"/>
+              <a:rPr lang="fr-FR" dirty="0"/>
               <a:t>Deuxième niveau</a:t>
             </a:r>
           </a:p>
           <a:p>
             <a:pPr lvl="2"/>
             <a:r>
-              <a:rPr lang="fr-FR" dirty="0" smtClean="0"/>
+              <a:rPr lang="fr-FR" dirty="0"/>
               <a:t>Troisième niveau</a:t>
             </a:r>
           </a:p>
           <a:p>
             <a:pPr lvl="3"/>
             <a:r>
-              <a:rPr lang="fr-FR" dirty="0" smtClean="0"/>
+              <a:rPr lang="fr-FR" dirty="0"/>
               <a:t>Quatrième niveau</a:t>
             </a:r>
           </a:p>
           <a:p>
             <a:pPr lvl="4"/>
             <a:r>
-              <a:rPr lang="fr-FR" dirty="0" smtClean="0"/>
+              <a:rPr lang="fr-FR" dirty="0"/>
               <a:t>Cinquième niveau</a:t>
             </a:r>
             <a:endParaRPr lang="en-US" dirty="0"/>
@@ -2663,7 +2609,7 @@
           <a:p>
             <a:fld id="{CFBFD163-B769-8340-9BFA-850DE925A786}" type="datetime6">
               <a:rPr lang="fr-FR" smtClean="0"/>
-              <a:t>February 20</a:t>
+              <a:t>septembre 21</a:t>
             </a:fld>
             <a:endParaRPr lang="en-US" dirty="0"/>
           </a:p>
@@ -2709,7 +2655,7 @@
           <a:lstStyle/>
           <a:p>
             <a:r>
-              <a:rPr lang="en-US" smtClean="0"/>
+              <a:rPr lang="en-US"/>
               <a:t>Click to edit Master title style</a:t>
             </a:r>
             <a:endParaRPr lang="fr-FR" dirty="0"/>
@@ -2726,13 +2672,6 @@
   <p:clrMapOvr>
     <a:masterClrMapping/>
   </p:clrMapOvr>
-  <p:timing>
-    <p:tnLst>
-      <p:par>
-        <p:cTn id="1" dur="indefinite" restart="never" nodeType="tmRoot"/>
-      </p:par>
-    </p:tnLst>
-  </p:timing>
 </p:sldLayout>
 </file>
 
@@ -2770,7 +2709,7 @@
           <a:p>
             <a:fld id="{D6DDDD81-934D-2440-96D5-710E55CF1726}" type="datetime6">
               <a:rPr lang="fr-FR" smtClean="0"/>
-              <a:t>February 20</a:t>
+              <a:t>septembre 21</a:t>
             </a:fld>
             <a:endParaRPr lang="en-US" dirty="0"/>
           </a:p>
@@ -2816,7 +2755,7 @@
           <a:lstStyle/>
           <a:p>
             <a:r>
-              <a:rPr lang="en-US" smtClean="0"/>
+              <a:rPr lang="en-US"/>
               <a:t>Click to edit Master title style</a:t>
             </a:r>
             <a:endParaRPr lang="fr-FR"/>
@@ -2873,35 +2812,35 @@
           <a:p>
             <a:pPr lvl="0"/>
             <a:r>
-              <a:rPr lang="fr-FR" dirty="0" smtClean="0"/>
+              <a:rPr lang="fr-FR" dirty="0"/>
               <a:t>Cliquez et modifiez le contenu</a:t>
             </a:r>
           </a:p>
           <a:p>
             <a:pPr lvl="1"/>
             <a:r>
-              <a:rPr lang="fr-FR" dirty="0" smtClean="0"/>
+              <a:rPr lang="fr-FR" dirty="0"/>
               <a:t>Deuxième niveau</a:t>
             </a:r>
           </a:p>
           <a:p>
             <a:pPr lvl="2"/>
             <a:r>
-              <a:rPr lang="fr-FR" dirty="0" smtClean="0"/>
+              <a:rPr lang="fr-FR" dirty="0"/>
               <a:t>Troisième niveau</a:t>
             </a:r>
           </a:p>
           <a:p>
             <a:pPr lvl="3"/>
             <a:r>
-              <a:rPr lang="fr-FR" dirty="0" smtClean="0"/>
+              <a:rPr lang="fr-FR" dirty="0"/>
               <a:t>Quatrième niveau</a:t>
             </a:r>
           </a:p>
           <a:p>
             <a:pPr lvl="4"/>
             <a:r>
-              <a:rPr lang="fr-FR" dirty="0" smtClean="0"/>
+              <a:rPr lang="fr-FR" dirty="0"/>
               <a:t>Cinquième niveau</a:t>
             </a:r>
             <a:endParaRPr lang="en-US" dirty="0"/>
@@ -2958,35 +2897,35 @@
           <a:p>
             <a:pPr lvl="0"/>
             <a:r>
-              <a:rPr lang="fr-FR" dirty="0" smtClean="0"/>
+              <a:rPr lang="fr-FR" dirty="0"/>
               <a:t>Cliquez et modifiez le contenu</a:t>
             </a:r>
           </a:p>
           <a:p>
             <a:pPr lvl="1"/>
             <a:r>
-              <a:rPr lang="fr-FR" dirty="0" smtClean="0"/>
+              <a:rPr lang="fr-FR" dirty="0"/>
               <a:t>Deuxième niveau</a:t>
             </a:r>
           </a:p>
           <a:p>
             <a:pPr lvl="2"/>
             <a:r>
-              <a:rPr lang="fr-FR" dirty="0" smtClean="0"/>
+              <a:rPr lang="fr-FR" dirty="0"/>
               <a:t>Troisième niveau</a:t>
             </a:r>
           </a:p>
           <a:p>
             <a:pPr lvl="3"/>
             <a:r>
-              <a:rPr lang="fr-FR" dirty="0" smtClean="0"/>
+              <a:rPr lang="fr-FR" dirty="0"/>
               <a:t>Quatrième niveau</a:t>
             </a:r>
           </a:p>
           <a:p>
             <a:pPr lvl="4"/>
             <a:r>
-              <a:rPr lang="fr-FR" dirty="0" smtClean="0"/>
+              <a:rPr lang="fr-FR" dirty="0"/>
               <a:t>Cinquième niveau</a:t>
             </a:r>
             <a:endParaRPr lang="en-US" dirty="0"/>
@@ -3044,13 +2983,6 @@
   <p:clrMapOvr>
     <a:masterClrMapping/>
   </p:clrMapOvr>
-  <p:timing>
-    <p:tnLst>
-      <p:par>
-        <p:cTn id="1" dur="indefinite" restart="never" nodeType="tmRoot"/>
-      </p:par>
-    </p:tnLst>
-  </p:timing>
 </p:sldLayout>
 </file>
 
@@ -3091,7 +3023,7 @@
           </a:lstStyle>
           <a:p>
             <a:r>
-              <a:rPr lang="en-US" smtClean="0"/>
+              <a:rPr lang="en-US"/>
               <a:t>Click to edit Master title style</a:t>
             </a:r>
             <a:endParaRPr lang="en-US" dirty="0"/>
@@ -3163,15 +3095,15 @@
           <a:p>
             <a:pPr lvl="0"/>
             <a:r>
-              <a:rPr lang="fr-FR" dirty="0" smtClean="0"/>
+              <a:rPr lang="fr-FR" dirty="0"/>
               <a:t>Cliquez ET </a:t>
             </a:r>
             <a:r>
-              <a:rPr lang="fr-FR" dirty="0" err="1" smtClean="0"/>
+              <a:rPr lang="fr-FR" dirty="0" err="1"/>
               <a:t>modifieZ</a:t>
             </a:r>
             <a:r>
-              <a:rPr lang="fr-FR" dirty="0" smtClean="0"/>
+              <a:rPr lang="fr-FR" dirty="0"/>
               <a:t> LE TITRE</a:t>
             </a:r>
           </a:p>
@@ -3227,35 +3159,35 @@
           <a:p>
             <a:pPr lvl="0"/>
             <a:r>
-              <a:rPr lang="fr-FR" dirty="0" smtClean="0"/>
+              <a:rPr lang="fr-FR" dirty="0"/>
               <a:t>Cliquez et modifiez le contenu</a:t>
             </a:r>
           </a:p>
           <a:p>
             <a:pPr lvl="1"/>
             <a:r>
-              <a:rPr lang="fr-FR" dirty="0" smtClean="0"/>
+              <a:rPr lang="fr-FR" dirty="0"/>
               <a:t>Deuxième niveau</a:t>
             </a:r>
           </a:p>
           <a:p>
             <a:pPr lvl="2"/>
             <a:r>
-              <a:rPr lang="fr-FR" dirty="0" smtClean="0"/>
+              <a:rPr lang="fr-FR" dirty="0"/>
               <a:t>Troisième niveau</a:t>
             </a:r>
           </a:p>
           <a:p>
             <a:pPr lvl="3"/>
             <a:r>
-              <a:rPr lang="fr-FR" dirty="0" smtClean="0"/>
+              <a:rPr lang="fr-FR" dirty="0"/>
               <a:t>Quatrième niveau</a:t>
             </a:r>
           </a:p>
           <a:p>
             <a:pPr lvl="4"/>
             <a:r>
-              <a:rPr lang="fr-FR" dirty="0" smtClean="0"/>
+              <a:rPr lang="fr-FR" dirty="0"/>
               <a:t>Cinquième niveau</a:t>
             </a:r>
             <a:endParaRPr lang="en-US" dirty="0"/>
@@ -3327,15 +3259,15 @@
           <a:p>
             <a:pPr lvl="0"/>
             <a:r>
-              <a:rPr lang="fr-FR" dirty="0" smtClean="0"/>
+              <a:rPr lang="fr-FR" dirty="0"/>
               <a:t>Cliquez ET </a:t>
             </a:r>
             <a:r>
-              <a:rPr lang="fr-FR" dirty="0" err="1" smtClean="0"/>
+              <a:rPr lang="fr-FR" dirty="0" err="1"/>
               <a:t>modifieZ</a:t>
             </a:r>
             <a:r>
-              <a:rPr lang="fr-FR" dirty="0" smtClean="0"/>
+              <a:rPr lang="fr-FR" dirty="0"/>
               <a:t> LE TITRE</a:t>
             </a:r>
           </a:p>
@@ -3391,35 +3323,35 @@
           <a:p>
             <a:pPr lvl="0"/>
             <a:r>
-              <a:rPr lang="fr-FR" dirty="0" smtClean="0"/>
+              <a:rPr lang="fr-FR" dirty="0"/>
               <a:t>Cliquez et modifiez le contenu</a:t>
             </a:r>
           </a:p>
           <a:p>
             <a:pPr lvl="1"/>
             <a:r>
-              <a:rPr lang="fr-FR" dirty="0" smtClean="0"/>
+              <a:rPr lang="fr-FR" dirty="0"/>
               <a:t>Deuxième niveau</a:t>
             </a:r>
           </a:p>
           <a:p>
             <a:pPr lvl="2"/>
             <a:r>
-              <a:rPr lang="fr-FR" dirty="0" smtClean="0"/>
+              <a:rPr lang="fr-FR" dirty="0"/>
               <a:t>Troisième niveau</a:t>
             </a:r>
           </a:p>
           <a:p>
             <a:pPr lvl="3"/>
             <a:r>
-              <a:rPr lang="fr-FR" dirty="0" smtClean="0"/>
+              <a:rPr lang="fr-FR" dirty="0"/>
               <a:t>Quatrième niveau</a:t>
             </a:r>
           </a:p>
           <a:p>
             <a:pPr lvl="4"/>
             <a:r>
-              <a:rPr lang="fr-FR" dirty="0" smtClean="0"/>
+              <a:rPr lang="fr-FR" dirty="0"/>
               <a:t>Cinquième niveau</a:t>
             </a:r>
             <a:endParaRPr lang="en-US" dirty="0"/>
@@ -3443,7 +3375,7 @@
           <a:p>
             <a:fld id="{9FC060DB-6E52-EB46-96C1-740CFB82B988}" type="datetime6">
               <a:rPr lang="fr-FR" smtClean="0"/>
-              <a:t>February 20</a:t>
+              <a:t>septembre 21</a:t>
             </a:fld>
             <a:endParaRPr lang="en-US" dirty="0"/>
           </a:p>
@@ -3524,13 +3456,6 @@
   <p:clrMapOvr>
     <a:masterClrMapping/>
   </p:clrMapOvr>
-  <p:timing>
-    <p:tnLst>
-      <p:par>
-        <p:cTn id="1" dur="indefinite" restart="never" nodeType="tmRoot"/>
-      </p:par>
-    </p:tnLst>
-  </p:timing>
 </p:sldLayout>
 </file>
 
@@ -3567,7 +3492,7 @@
           <a:lstStyle/>
           <a:p>
             <a:r>
-              <a:rPr lang="en-US" smtClean="0"/>
+              <a:rPr lang="en-US"/>
               <a:t>Click to edit Master title style</a:t>
             </a:r>
             <a:endParaRPr lang="fr-FR" dirty="0"/>
@@ -3591,7 +3516,7 @@
           <a:p>
             <a:fld id="{DF677A4E-A05D-044B-B606-EB8FC4116036}" type="datetime6">
               <a:rPr lang="fr-FR" smtClean="0"/>
-              <a:t>February 20</a:t>
+              <a:t>septembre 21</a:t>
             </a:fld>
             <a:endParaRPr lang="en-US" dirty="0"/>
           </a:p>
@@ -3672,13 +3597,6 @@
   <p:clrMapOvr>
     <a:masterClrMapping/>
   </p:clrMapOvr>
-  <p:timing>
-    <p:tnLst>
-      <p:par>
-        <p:cTn id="1" dur="indefinite" restart="never" nodeType="tmRoot"/>
-      </p:par>
-    </p:tnLst>
-  </p:timing>
 </p:sldLayout>
 </file>
 
@@ -3743,7 +3661,7 @@
             <a:fld id="{D4BF065C-C26E-9B4C-AB1D-0F16CDF9EF28}" type="datetime6">
               <a:rPr lang="fr-FR" smtClean="0"/>
               <a:pPr/>
-              <a:t>February 20</a:t>
+              <a:t>septembre 21</a:t>
             </a:fld>
             <a:endParaRPr lang="en-US" dirty="0"/>
           </a:p>
@@ -3850,13 +3768,6 @@
   <p:clrMapOvr>
     <a:masterClrMapping/>
   </p:clrMapOvr>
-  <p:timing>
-    <p:tnLst>
-      <p:par>
-        <p:cTn id="1" dur="indefinite" restart="never" nodeType="tmRoot"/>
-      </p:par>
-    </p:tnLst>
-  </p:timing>
 </p:sldLayout>
 </file>
 
@@ -3908,7 +3819,7 @@
           <a:lstStyle/>
           <a:p>
             <a:r>
-              <a:rPr lang="fr-FR" dirty="0" smtClean="0"/>
+              <a:rPr lang="fr-FR" dirty="0"/>
               <a:t>Cliquez et modifiez le titre</a:t>
             </a:r>
             <a:endParaRPr lang="en-US" dirty="0"/>
@@ -3942,35 +3853,35 @@
           <a:p>
             <a:pPr lvl="0"/>
             <a:r>
-              <a:rPr lang="fr-FR" dirty="0" smtClean="0"/>
+              <a:rPr lang="fr-FR" dirty="0"/>
               <a:t>Cliquez et modifiez le contenu</a:t>
             </a:r>
           </a:p>
           <a:p>
             <a:pPr lvl="1"/>
             <a:r>
-              <a:rPr lang="fr-FR" dirty="0" smtClean="0"/>
+              <a:rPr lang="fr-FR" dirty="0"/>
               <a:t>Deuxième niveau</a:t>
             </a:r>
           </a:p>
           <a:p>
             <a:pPr lvl="2"/>
             <a:r>
-              <a:rPr lang="fr-FR" dirty="0" smtClean="0"/>
+              <a:rPr lang="fr-FR" dirty="0"/>
               <a:t>Troisième niveau</a:t>
             </a:r>
           </a:p>
           <a:p>
             <a:pPr lvl="3"/>
             <a:r>
-              <a:rPr lang="fr-FR" dirty="0" smtClean="0"/>
+              <a:rPr lang="fr-FR" dirty="0"/>
               <a:t>Quatrième niveau</a:t>
             </a:r>
           </a:p>
           <a:p>
             <a:pPr lvl="4"/>
             <a:r>
-              <a:rPr lang="fr-FR" dirty="0" smtClean="0"/>
+              <a:rPr lang="fr-FR" dirty="0"/>
               <a:t>Cinquième niveau</a:t>
             </a:r>
             <a:endParaRPr lang="en-US" dirty="0"/>
@@ -4021,7 +3932,7 @@
             <a:fld id="{22DD8F49-BF83-0E4D-8954-2DA98C3220A2}" type="datetime6">
               <a:rPr lang="fr-FR" smtClean="0"/>
               <a:pPr/>
-              <a:t>February 20</a:t>
+              <a:t>septembre 21</a:t>
             </a:fld>
             <a:endParaRPr lang="en-US" dirty="0"/>
           </a:p>
@@ -4100,13 +4011,6 @@
     <p:sldLayoutId id="2147483677" r:id="rId12"/>
     <p:sldLayoutId id="2147483680" r:id="rId13"/>
   </p:sldLayoutIdLst>
-  <p:timing>
-    <p:tnLst>
-      <p:par>
-        <p:cTn id="1" dur="indefinite" restart="never" nodeType="tmRoot"/>
-      </p:par>
-    </p:tnLst>
-  </p:timing>
   <p:hf hdr="0" ftr="0"/>
   <p:txStyles>
     <p:titleStyle>
@@ -4441,7 +4345,7 @@
           <a:p>
             <a:pPr algn="ctr"/>
             <a:r>
-              <a:rPr lang="en-US" dirty="0" err="1" smtClean="0"/>
+              <a:rPr lang="en-US" dirty="0" err="1"/>
               <a:t>vv</a:t>
             </a:r>
             <a:endParaRPr lang="en-US" dirty="0"/>
@@ -4495,10 +4399,9 @@
           <a:p>
             <a:pPr algn="ctr"/>
             <a:r>
-              <a:rPr lang="en-US" dirty="0" smtClean="0"/>
+              <a:rPr lang="en-US" dirty="0"/>
               <a:t>v</a:t>
             </a:r>
-            <a:endParaRPr lang="en-US" dirty="0"/>
           </a:p>
         </p:txBody>
       </p:sp>
@@ -4549,10 +4452,9 @@
           <a:p>
             <a:pPr algn="ctr"/>
             <a:r>
-              <a:rPr lang="en-US" dirty="0" smtClean="0"/>
+              <a:rPr lang="en-US" dirty="0"/>
               <a:t>v</a:t>
             </a:r>
-            <a:endParaRPr lang="en-US" dirty="0"/>
           </a:p>
         </p:txBody>
       </p:sp>
@@ -4580,7 +4482,7 @@
           <a:p>
             <a:pPr algn="ctr"/>
             <a:r>
-              <a:rPr lang="en-US" dirty="0" smtClean="0">
+              <a:rPr lang="en-US" dirty="0">
                 <a:solidFill>
                   <a:srgbClr val="FF0000"/>
                 </a:solidFill>
@@ -4590,14 +4492,6 @@
               </a:rPr>
               <a:t>Test</a:t>
             </a:r>
-            <a:endParaRPr lang="en-US" dirty="0">
-              <a:solidFill>
-                <a:srgbClr val="FF0000"/>
-              </a:solidFill>
-              <a:latin typeface="Source Sans Pro" charset="0"/>
-              <a:ea typeface="Source Sans Pro" charset="0"/>
-              <a:cs typeface="Source Sans Pro" charset="0"/>
-            </a:endParaRPr>
           </a:p>
         </p:txBody>
       </p:sp>
@@ -4625,7 +4519,7 @@
           <a:p>
             <a:pPr algn="ctr"/>
             <a:r>
-              <a:rPr lang="en-US" dirty="0" smtClean="0">
+              <a:rPr lang="en-US" dirty="0">
                 <a:solidFill>
                   <a:srgbClr val="FF0000"/>
                 </a:solidFill>
@@ -4635,14 +4529,6 @@
               </a:rPr>
               <a:t>Deploy</a:t>
             </a:r>
-            <a:endParaRPr lang="en-US" dirty="0">
-              <a:solidFill>
-                <a:srgbClr val="FF0000"/>
-              </a:solidFill>
-              <a:latin typeface="Source Sans Pro" charset="0"/>
-              <a:ea typeface="Source Sans Pro" charset="0"/>
-              <a:cs typeface="Source Sans Pro" charset="0"/>
-            </a:endParaRPr>
           </a:p>
         </p:txBody>
       </p:sp>
@@ -4670,7 +4556,7 @@
           <a:p>
             <a:pPr algn="ctr"/>
             <a:r>
-              <a:rPr lang="en-US" dirty="0" smtClean="0">
+              <a:rPr lang="en-US" dirty="0">
                 <a:solidFill>
                   <a:srgbClr val="FF0000"/>
                 </a:solidFill>
@@ -4680,14 +4566,6 @@
               </a:rPr>
               <a:t>Publish</a:t>
             </a:r>
-            <a:endParaRPr lang="en-US" dirty="0">
-              <a:solidFill>
-                <a:srgbClr val="FF0000"/>
-              </a:solidFill>
-              <a:latin typeface="Source Sans Pro" charset="0"/>
-              <a:ea typeface="Source Sans Pro" charset="0"/>
-              <a:cs typeface="Source Sans Pro" charset="0"/>
-            </a:endParaRPr>
           </a:p>
         </p:txBody>
       </p:sp>
@@ -4924,7 +4802,7 @@
               <a:buClrTx/>
             </a:pPr>
             <a:r>
-              <a:rPr lang="en-US" sz="2200" dirty="0" smtClean="0">
+              <a:rPr lang="en-US" sz="2200" dirty="0">
                 <a:solidFill>
                   <a:schemeClr val="tx1">
                     <a:lumMod val="75000"/>
@@ -4936,16 +4814,6 @@
               </a:rPr>
               <a:t>Simulator</a:t>
             </a:r>
-            <a:endParaRPr lang="en-US" sz="2200" dirty="0">
-              <a:solidFill>
-                <a:schemeClr val="tx1">
-                  <a:lumMod val="75000"/>
-                </a:schemeClr>
-              </a:solidFill>
-              <a:latin typeface="Source Sans Pro Light" charset="0"/>
-              <a:ea typeface="Source Sans Pro Light" charset="0"/>
-              <a:cs typeface="Source Sans Pro Light" charset="0"/>
-            </a:endParaRPr>
           </a:p>
         </p:txBody>
       </p:sp>
@@ -4977,7 +4845,7 @@
               <a:buClrTx/>
             </a:pPr>
             <a:r>
-              <a:rPr lang="en-US" sz="2200" dirty="0" smtClean="0">
+              <a:rPr lang="en-US" sz="2200" dirty="0">
                 <a:solidFill>
                   <a:schemeClr val="tx1">
                     <a:lumMod val="75000"/>
@@ -4989,22 +4857,12 @@
               </a:rPr>
               <a:t>Target</a:t>
             </a:r>
-            <a:endParaRPr lang="en-US" sz="2200" dirty="0">
-              <a:solidFill>
-                <a:schemeClr val="tx1">
-                  <a:lumMod val="75000"/>
-                </a:schemeClr>
-              </a:solidFill>
-              <a:latin typeface="Source Sans Pro Light" charset="0"/>
-              <a:ea typeface="Source Sans Pro Light" charset="0"/>
-              <a:cs typeface="Source Sans Pro Light" charset="0"/>
-            </a:endParaRPr>
           </a:p>
         </p:txBody>
       </p:sp>
       <p:pic>
         <p:nvPicPr>
-          <p:cNvPr id="65" name="Picture 64"/>
+          <p:cNvPr id="66" name="Picture 65"/>
           <p:cNvPicPr>
             <a:picLocks noChangeAspect="1"/>
           </p:cNvPicPr>
@@ -5023,36 +4881,6 @@
           </a:stretch>
         </p:blipFill>
         <p:spPr>
-          <a:xfrm>
-            <a:off x="2008303" y="2986291"/>
-            <a:ext cx="2166119" cy="400733"/>
-          </a:xfrm>
-          <a:prstGeom prst="rect">
-            <a:avLst/>
-          </a:prstGeom>
-        </p:spPr>
-      </p:pic>
-      <p:pic>
-        <p:nvPicPr>
-          <p:cNvPr id="66" name="Picture 65"/>
-          <p:cNvPicPr>
-            <a:picLocks noChangeAspect="1"/>
-          </p:cNvPicPr>
-          <p:nvPr/>
-        </p:nvPicPr>
-        <p:blipFill>
-          <a:blip r:embed="rId5" cstate="print">
-            <a:extLst>
-              <a:ext uri="{28A0092B-C50C-407E-A947-70E740481C1C}">
-                <a14:useLocalDpi xmlns:a14="http://schemas.microsoft.com/office/drawing/2010/main" val="0"/>
-              </a:ext>
-            </a:extLst>
-          </a:blip>
-          <a:stretch>
-            <a:fillRect/>
-          </a:stretch>
-        </p:blipFill>
-        <p:spPr>
           <a:xfrm rot="5400000">
             <a:off x="5091202" y="2611222"/>
             <a:ext cx="2076731" cy="1837905"/>
@@ -5086,7 +4914,7 @@
           <a:p>
             <a:pPr algn="ctr"/>
             <a:r>
-              <a:rPr lang="en-US" sz="2100" dirty="0" smtClean="0">
+              <a:rPr lang="en-US" sz="2100" dirty="0">
                 <a:solidFill>
                   <a:schemeClr val="accent6"/>
                 </a:solidFill>
@@ -5100,7 +4928,7 @@
           <a:p>
             <a:pPr algn="ctr"/>
             <a:r>
-              <a:rPr lang="en-US" sz="2100" dirty="0" smtClean="0">
+              <a:rPr lang="en-US" sz="2100" dirty="0">
                 <a:solidFill>
                   <a:schemeClr val="accent6"/>
                 </a:solidFill>
@@ -5110,14 +4938,6 @@
               </a:rPr>
               <a:t>APPLICATION</a:t>
             </a:r>
-            <a:endParaRPr lang="en-US" sz="2100" dirty="0">
-              <a:solidFill>
-                <a:schemeClr val="accent6"/>
-              </a:solidFill>
-              <a:latin typeface="Source Sans Pro Light" charset="0"/>
-              <a:ea typeface="Source Sans Pro Light" charset="0"/>
-              <a:cs typeface="Source Sans Pro Light" charset="0"/>
-            </a:endParaRPr>
           </a:p>
         </p:txBody>
       </p:sp>
@@ -5144,7 +4964,7 @@
             <p:nvPr/>
           </p:nvPicPr>
           <p:blipFill rotWithShape="1">
-            <a:blip r:embed="rId6" cstate="print">
+            <a:blip r:embed="rId5" cstate="print">
               <a:extLst>
                 <a:ext uri="{28A0092B-C50C-407E-A947-70E740481C1C}">
                   <a14:useLocalDpi xmlns:a14="http://schemas.microsoft.com/office/drawing/2010/main" val="0"/>
@@ -5173,7 +4993,7 @@
             <p:nvPr/>
           </p:nvPicPr>
           <p:blipFill>
-            <a:blip r:embed="rId7">
+            <a:blip r:embed="rId6" cstate="print">
               <a:extLst>
                 <a:ext uri="{28A0092B-C50C-407E-A947-70E740481C1C}">
                   <a14:useLocalDpi xmlns:a14="http://schemas.microsoft.com/office/drawing/2010/main" val="0"/>
@@ -5204,7 +5024,7 @@
           <p:nvPr/>
         </p:nvPicPr>
         <p:blipFill>
-          <a:blip r:embed="rId7">
+          <a:blip r:embed="rId7" cstate="print">
             <a:extLst>
               <a:ext uri="{28A0092B-C50C-407E-A947-70E740481C1C}">
                 <a14:useLocalDpi xmlns:a14="http://schemas.microsoft.com/office/drawing/2010/main" val="0"/>
@@ -5219,6 +5039,41 @@
           <a:xfrm>
             <a:off x="8246604" y="4203495"/>
             <a:ext cx="2339408" cy="1274978"/>
+          </a:xfrm>
+          <a:prstGeom prst="rect">
+            <a:avLst/>
+          </a:prstGeom>
+        </p:spPr>
+      </p:pic>
+      <p:pic>
+        <p:nvPicPr>
+          <p:cNvPr id="23" name="Picture 22">
+            <a:extLst>
+              <a:ext uri="{FF2B5EF4-FFF2-40B4-BE49-F238E27FC236}">
+                <a16:creationId xmlns:a16="http://schemas.microsoft.com/office/drawing/2014/main" id="{B52FF1BD-8F2A-4171-9E10-08A0D3C19998}"/>
+              </a:ext>
+            </a:extLst>
+          </p:cNvPr>
+          <p:cNvPicPr>
+            <a:picLocks noChangeAspect="1"/>
+          </p:cNvPicPr>
+          <p:nvPr/>
+        </p:nvPicPr>
+        <p:blipFill rotWithShape="1">
+          <a:blip r:embed="rId8" cstate="print">
+            <a:extLst>
+              <a:ext uri="{28A0092B-C50C-407E-A947-70E740481C1C}">
+                <a14:useLocalDpi xmlns:a14="http://schemas.microsoft.com/office/drawing/2010/main" val="0"/>
+              </a:ext>
+            </a:extLst>
+          </a:blip>
+          <a:srcRect t="80931" b="-3006"/>
+          <a:stretch/>
+        </p:blipFill>
+        <p:spPr>
+          <a:xfrm>
+            <a:off x="2129210" y="2986292"/>
+            <a:ext cx="2078307" cy="458740"/>
           </a:xfrm>
           <a:prstGeom prst="rect">
             <a:avLst/>
@@ -5235,13 +5090,6 @@
   <p:clrMapOvr>
     <a:masterClrMapping/>
   </p:clrMapOvr>
-  <p:timing>
-    <p:tnLst>
-      <p:par>
-        <p:cTn id="1" dur="indefinite" restart="never" nodeType="tmRoot"/>
-      </p:par>
-    </p:tnLst>
-  </p:timing>
 </p:sld>
 </file>
 

</xml_diff>